<commit_message>
added more slide decks, through 12
</commit_message>
<xml_diff>
--- a/slides/Online/2020/03a - ObjectsMethods.pptx
+++ b/slides/Online/2020/03a - ObjectsMethods.pptx
@@ -218,7 +218,7 @@
           <a:p>
             <a:fld id="{4D7E51A5-B478-1E40-8CBB-0DAA8831E99D}" type="datetimeFigureOut">
               <a:rPr lang="en-US" smtClean="0"/>
-              <a:t>3/8/20</a:t>
+              <a:t>3/9/20</a:t>
             </a:fld>
             <a:endParaRPr lang="en-US"/>
           </a:p>
@@ -383,7 +383,7 @@
           <a:p>
             <a:fld id="{D0ED587F-861E-6740-9643-E3DDAE89B8D6}" type="datetimeFigureOut">
               <a:rPr lang="en-US" smtClean="0"/>
-              <a:t>3/8/20</a:t>
+              <a:t>3/9/20</a:t>
             </a:fld>
             <a:endParaRPr lang="en-US"/>
           </a:p>
@@ -7776,7 +7776,7 @@
                 <a:latin typeface="Consolas" panose="020B0609020204030204" pitchFamily="49" charset="0"/>
                 <a:cs typeface="Consolas" panose="020B0609020204030204" pitchFamily="49" charset="0"/>
               </a:rPr>
-              <a:t>myRectangle</a:t>
+              <a:t>smallBuildingOnCampus</a:t>
             </a:r>
             <a:r>
               <a:rPr lang="en-US" sz="1200" dirty="0">
@@ -9074,8 +9074,8 @@
         </p:nvSpPr>
         <p:spPr>
           <a:xfrm>
-            <a:off x="6570133" y="4908898"/>
-            <a:ext cx="1681871" cy="400110"/>
+            <a:off x="5327204" y="4934620"/>
+            <a:ext cx="2996333" cy="400110"/>
           </a:xfrm>
           <a:prstGeom prst="rect">
             <a:avLst/>
@@ -9090,7 +9090,7 @@
           <a:p>
             <a:r>
               <a:rPr lang="en-US" dirty="0" err="1"/>
-              <a:t>myRectangle</a:t>
+              <a:t>smallBuildingOnCampus</a:t>
             </a:r>
             <a:endParaRPr lang="en-US" dirty="0"/>
           </a:p>

</xml_diff>